<commit_message>
added interactivity to bubble plot in powerpoint
</commit_message>
<xml_diff>
--- a/Project1.pptx
+++ b/Project1.pptx
@@ -6674,6 +6674,7 @@
       <p:pic>
         <p:nvPicPr>
           <p:cNvPr id="5" name="Content Placeholder 4">
+            <a:hlinkClick r:id="rId2"/>
             <a:extLst>
               <a:ext uri="{FF2B5EF4-FFF2-40B4-BE49-F238E27FC236}">
                 <a16:creationId xmlns:a16="http://schemas.microsoft.com/office/drawing/2014/main" id="{5168CB32-278A-4B5D-8F81-3149D85D8F84}"/>
@@ -6688,7 +6689,7 @@
           </p:nvPr>
         </p:nvPicPr>
         <p:blipFill>
-          <a:blip r:embed="rId2"/>
+          <a:blip r:embed="rId3"/>
           <a:stretch>
             <a:fillRect/>
           </a:stretch>
@@ -6703,6 +6704,134 @@
           </a:prstGeom>
         </p:spPr>
       </p:pic>
+      <mc:AlternateContent xmlns:mc="http://schemas.openxmlformats.org/markup-compatibility/2006">
+        <mc:Choice xmlns:a14="http://schemas.microsoft.com/office/drawing/2010/main" Requires="a14">
+          <p:sp>
+            <p:nvSpPr>
+              <p:cNvPr id="3" name="TextBox 2">
+                <a:extLst>
+                  <a:ext uri="{FF2B5EF4-FFF2-40B4-BE49-F238E27FC236}">
+                    <a16:creationId xmlns:a16="http://schemas.microsoft.com/office/drawing/2014/main" id="{A8F09D90-5E3D-41A3-8D95-E4337BBF2948}"/>
+                  </a:ext>
+                </a:extLst>
+              </p:cNvPr>
+              <p:cNvSpPr txBox="1"/>
+              <p:nvPr/>
+            </p:nvSpPr>
+            <p:spPr>
+              <a:xfrm>
+                <a:off x="932129" y="5341039"/>
+                <a:ext cx="6360524" cy="923330"/>
+              </a:xfrm>
+              <a:prstGeom prst="rect">
+                <a:avLst/>
+              </a:prstGeom>
+              <a:noFill/>
+            </p:spPr>
+            <p:txBody>
+              <a:bodyPr wrap="none" rtlCol="0">
+                <a:spAutoFit/>
+              </a:bodyPr>
+              <a:lstStyle/>
+              <a:p>
+                <a:r>
+                  <a:rPr lang="en-US" dirty="0"/>
+                  <a:t>Happiness vs Log GDP per capita: p-value was too small to print</a:t>
+                </a:r>
+              </a:p>
+              <a:p>
+                <a:r>
+                  <a:rPr lang="en-US" dirty="0"/>
+                  <a:t>Happiness vs Freedom: p-value = </a:t>
+                </a:r>
+                <a14:m>
+                  <m:oMath xmlns:m="http://schemas.openxmlformats.org/officeDocument/2006/math">
+                    <m:r>
+                      <a:rPr lang="en-US" b="0" i="1" smtClean="0">
+                        <a:latin typeface="Cambria Math" panose="02040503050406030204" pitchFamily="18" charset="0"/>
+                      </a:rPr>
+                      <m:t>6.76∗</m:t>
+                    </m:r>
+                    <m:sSup>
+                      <m:sSupPr>
+                        <m:ctrlPr>
+                          <a:rPr lang="en-US" b="0" i="1" smtClean="0">
+                            <a:latin typeface="Cambria Math" panose="02040503050406030204" pitchFamily="18" charset="0"/>
+                          </a:rPr>
+                        </m:ctrlPr>
+                      </m:sSupPr>
+                      <m:e>
+                        <m:r>
+                          <a:rPr lang="en-US" b="0" i="1" smtClean="0">
+                            <a:latin typeface="Cambria Math" panose="02040503050406030204" pitchFamily="18" charset="0"/>
+                          </a:rPr>
+                          <m:t>10</m:t>
+                        </m:r>
+                      </m:e>
+                      <m:sup>
+                        <m:r>
+                          <a:rPr lang="en-US" b="0" i="1" smtClean="0">
+                            <a:latin typeface="Cambria Math" panose="02040503050406030204" pitchFamily="18" charset="0"/>
+                          </a:rPr>
+                          <m:t>−118</m:t>
+                        </m:r>
+                      </m:sup>
+                    </m:sSup>
+                  </m:oMath>
+                </a14:m>
+                <a:endParaRPr lang="en-US" b="0" dirty="0"/>
+              </a:p>
+              <a:p>
+                <a:endParaRPr lang="en-US" dirty="0"/>
+              </a:p>
+            </p:txBody>
+          </p:sp>
+        </mc:Choice>
+        <mc:Fallback>
+          <p:sp>
+            <p:nvSpPr>
+              <p:cNvPr id="3" name="TextBox 2">
+                <a:extLst>
+                  <a:ext uri="{FF2B5EF4-FFF2-40B4-BE49-F238E27FC236}">
+                    <a16:creationId xmlns:a16="http://schemas.microsoft.com/office/drawing/2014/main" id="{A8F09D90-5E3D-41A3-8D95-E4337BBF2948}"/>
+                  </a:ext>
+                </a:extLst>
+              </p:cNvPr>
+              <p:cNvSpPr txBox="1">
+                <a:spLocks noRot="1" noChangeAspect="1" noMove="1" noResize="1" noEditPoints="1" noAdjustHandles="1" noChangeArrowheads="1" noChangeShapeType="1" noTextEdit="1"/>
+              </p:cNvSpPr>
+              <p:nvPr/>
+            </p:nvSpPr>
+            <p:spPr>
+              <a:xfrm>
+                <a:off x="932129" y="5341039"/>
+                <a:ext cx="6360524" cy="923330"/>
+              </a:xfrm>
+              <a:prstGeom prst="rect">
+                <a:avLst/>
+              </a:prstGeom>
+              <a:blipFill>
+                <a:blip r:embed="rId4"/>
+                <a:stretch>
+                  <a:fillRect l="-863" t="-3289" r="-96"/>
+                </a:stretch>
+              </a:blipFill>
+            </p:spPr>
+            <p:txBody>
+              <a:bodyPr/>
+              <a:lstStyle/>
+              <a:p>
+                <a:r>
+                  <a:rPr lang="en-US">
+                    <a:noFill/>
+                  </a:rPr>
+                  <a:t> </a:t>
+                </a:r>
+              </a:p>
+            </p:txBody>
+          </p:sp>
+        </mc:Fallback>
+      </mc:AlternateContent>
     </p:spTree>
     <p:extLst>
       <p:ext uri="{BB962C8B-B14F-4D97-AF65-F5344CB8AC3E}">
@@ -7311,6 +7440,125 @@
           </a:ln>
         </p:spPr>
       </p:sp>
+      <mc:AlternateContent xmlns:mc="http://schemas.openxmlformats.org/markup-compatibility/2006">
+        <mc:Choice xmlns:a14="http://schemas.microsoft.com/office/drawing/2010/main" Requires="a14">
+          <p:sp>
+            <p:nvSpPr>
+              <p:cNvPr id="3" name="TextBox 2">
+                <a:extLst>
+                  <a:ext uri="{FF2B5EF4-FFF2-40B4-BE49-F238E27FC236}">
+                    <a16:creationId xmlns:a16="http://schemas.microsoft.com/office/drawing/2014/main" id="{6F8AB27C-DC90-488B-BE91-0B39AADC17D8}"/>
+                  </a:ext>
+                </a:extLst>
+              </p:cNvPr>
+              <p:cNvSpPr txBox="1"/>
+              <p:nvPr/>
+            </p:nvSpPr>
+            <p:spPr>
+              <a:xfrm>
+                <a:off x="2510158" y="5673730"/>
+                <a:ext cx="6852710" cy="369332"/>
+              </a:xfrm>
+              <a:prstGeom prst="rect">
+                <a:avLst/>
+              </a:prstGeom>
+              <a:noFill/>
+            </p:spPr>
+            <p:txBody>
+              <a:bodyPr wrap="none" rtlCol="0">
+                <a:spAutoFit/>
+              </a:bodyPr>
+              <a:lstStyle/>
+              <a:p>
+                <a:r>
+                  <a:rPr lang="en-US" dirty="0"/>
+                  <a:t>Happiness vs Consumer Electronics Revenue: p-value = </a:t>
+                </a:r>
+                <a14:m>
+                  <m:oMath xmlns:m="http://schemas.openxmlformats.org/officeDocument/2006/math">
+                    <m:r>
+                      <a:rPr lang="en-US" b="0" i="1" smtClean="0">
+                        <a:latin typeface="Cambria Math" panose="02040503050406030204" pitchFamily="18" charset="0"/>
+                      </a:rPr>
+                      <m:t>1.63∗</m:t>
+                    </m:r>
+                    <m:sSup>
+                      <m:sSupPr>
+                        <m:ctrlPr>
+                          <a:rPr lang="en-US" b="0" i="1" smtClean="0">
+                            <a:latin typeface="Cambria Math" panose="02040503050406030204" pitchFamily="18" charset="0"/>
+                          </a:rPr>
+                        </m:ctrlPr>
+                      </m:sSupPr>
+                      <m:e>
+                        <m:r>
+                          <a:rPr lang="en-US" b="0" i="1" smtClean="0">
+                            <a:latin typeface="Cambria Math" panose="02040503050406030204" pitchFamily="18" charset="0"/>
+                          </a:rPr>
+                          <m:t>10</m:t>
+                        </m:r>
+                      </m:e>
+                      <m:sup>
+                        <m:r>
+                          <a:rPr lang="en-US" b="0" i="1" smtClean="0">
+                            <a:latin typeface="Cambria Math" panose="02040503050406030204" pitchFamily="18" charset="0"/>
+                          </a:rPr>
+                          <m:t>−39</m:t>
+                        </m:r>
+                      </m:sup>
+                    </m:sSup>
+                  </m:oMath>
+                </a14:m>
+                <a:endParaRPr lang="en-US" b="0" dirty="0"/>
+              </a:p>
+            </p:txBody>
+          </p:sp>
+        </mc:Choice>
+        <mc:Fallback>
+          <p:sp>
+            <p:nvSpPr>
+              <p:cNvPr id="3" name="TextBox 2">
+                <a:extLst>
+                  <a:ext uri="{FF2B5EF4-FFF2-40B4-BE49-F238E27FC236}">
+                    <a16:creationId xmlns:a16="http://schemas.microsoft.com/office/drawing/2014/main" id="{6F8AB27C-DC90-488B-BE91-0B39AADC17D8}"/>
+                  </a:ext>
+                </a:extLst>
+              </p:cNvPr>
+              <p:cNvSpPr txBox="1">
+                <a:spLocks noRot="1" noChangeAspect="1" noMove="1" noResize="1" noEditPoints="1" noAdjustHandles="1" noChangeArrowheads="1" noChangeShapeType="1" noTextEdit="1"/>
+              </p:cNvSpPr>
+              <p:nvPr/>
+            </p:nvSpPr>
+            <p:spPr>
+              <a:xfrm>
+                <a:off x="2510158" y="5673730"/>
+                <a:ext cx="6852710" cy="369332"/>
+              </a:xfrm>
+              <a:prstGeom prst="rect">
+                <a:avLst/>
+              </a:prstGeom>
+              <a:blipFill>
+                <a:blip r:embed="rId4"/>
+                <a:stretch>
+                  <a:fillRect l="-801" t="-10000" b="-26667"/>
+                </a:stretch>
+              </a:blipFill>
+            </p:spPr>
+            <p:txBody>
+              <a:bodyPr/>
+              <a:lstStyle/>
+              <a:p>
+                <a:r>
+                  <a:rPr lang="en-US">
+                    <a:noFill/>
+                  </a:rPr>
+                  <a:t> </a:t>
+                </a:r>
+              </a:p>
+            </p:txBody>
+          </p:sp>
+        </mc:Fallback>
+      </mc:AlternateContent>
     </p:spTree>
     <p:extLst>
       <p:ext uri="{BB962C8B-B14F-4D97-AF65-F5344CB8AC3E}">

</xml_diff>